<commit_message>
Results of first run
</commit_message>
<xml_diff>
--- a/Approval Tests.pptx
+++ b/Approval Tests.pptx
@@ -6,9 +6,10 @@
   </p:sldMasterIdLst>
   <p:sldIdLst>
     <p:sldId id="256" r:id="rId2"/>
-    <p:sldId id="257" r:id="rId3"/>
-    <p:sldId id="258" r:id="rId4"/>
-    <p:sldId id="259" r:id="rId5"/>
+    <p:sldId id="260" r:id="rId3"/>
+    <p:sldId id="257" r:id="rId4"/>
+    <p:sldId id="258" r:id="rId5"/>
+    <p:sldId id="259" r:id="rId6"/>
   </p:sldIdLst>
   <p:sldSz cx="9144000" cy="6858000" type="screen4x3"/>
   <p:notesSz cx="6858000" cy="9144000"/>
@@ -3194,7 +3195,7 @@
           <a:p>
             <a:r>
               <a:rPr lang="en-US" dirty="0" smtClean="0"/>
-              <a:t>Approval Tests</a:t>
+              <a:t>Slides &amp; Demo</a:t>
             </a:r>
             <a:endParaRPr lang="en-US" dirty="0"/>
           </a:p>
@@ -3212,36 +3213,25 @@
         </p:nvSpPr>
         <p:spPr/>
         <p:txBody>
-          <a:bodyPr/>
-          <a:lstStyle/>
-          <a:p>
-            <a:pPr marL="0" indent="0">
-              <a:buNone/>
-            </a:pPr>
-            <a:r>
-              <a:rPr lang="en-US" dirty="0" smtClean="0"/>
-              <a:t>Approval tests are a way of defining expectations for tests, but instead of specifying your expectations up </a:t>
-            </a:r>
-            <a:r>
-              <a:rPr lang="en-US" dirty="0" err="1" smtClean="0"/>
-              <a:t>fron</a:t>
-            </a:r>
-            <a:r>
-              <a:rPr lang="en-US" dirty="0" smtClean="0"/>
-              <a:t> and then coding until they are met you gradually build the expectation and when you are satisfied you </a:t>
-            </a:r>
-            <a:r>
-              <a:rPr lang="en-US" b="1" dirty="0" smtClean="0"/>
-              <a:t>lock it down</a:t>
-            </a:r>
-            <a:endParaRPr lang="en-US" dirty="0" smtClean="0"/>
+          <a:bodyPr>
+            <a:normAutofit/>
+          </a:bodyPr>
+          <a:lstStyle/>
+          <a:p>
+            <a:r>
+              <a:rPr lang="en-US" sz="2800" dirty="0" smtClean="0">
+                <a:hlinkClick r:id="rId2"/>
+              </a:rPr>
+              <a:t>https://github.com/chrisortman/ApprovalTestDemos</a:t>
+            </a:r>
+            <a:endParaRPr lang="en-US" sz="2800" dirty="0"/>
           </a:p>
         </p:txBody>
       </p:sp>
     </p:spTree>
     <p:extLst>
       <p:ext uri="{BB962C8B-B14F-4D97-AF65-F5344CB8AC3E}">
-        <p14:creationId xmlns:p14="http://schemas.microsoft.com/office/powerpoint/2010/main" val="1066659328"/>
+        <p14:creationId xmlns:p14="http://schemas.microsoft.com/office/powerpoint/2010/main" val="2183117171"/>
       </p:ext>
     </p:extLst>
   </p:cSld>
@@ -3313,49 +3303,25 @@
           <a:bodyPr/>
           <a:lstStyle/>
           <a:p>
+            <a:pPr marL="0" indent="0">
+              <a:buNone/>
+            </a:pPr>
             <a:r>
               <a:rPr lang="en-US" dirty="0" smtClean="0"/>
-              <a:t>Changes to </a:t>
-            </a:r>
-            <a:r>
-              <a:rPr lang="en-US" dirty="0" err="1" smtClean="0"/>
-              <a:t>exisiting</a:t>
-            </a:r>
-            <a:r>
-              <a:rPr lang="en-US" dirty="0" smtClean="0"/>
-              <a:t> code with little to no test coverage</a:t>
-            </a:r>
-          </a:p>
-          <a:p>
-            <a:r>
-              <a:rPr lang="en-US" dirty="0" smtClean="0"/>
-              <a:t>Producing public angle bracket is </a:t>
-            </a:r>
-            <a:r>
-              <a:rPr lang="en-US" dirty="0" err="1" smtClean="0"/>
-              <a:t>api’s</a:t>
+              <a:t>Approval tests are a way of defining expectations for tests, but instead of specifying your expectations up front and then coding until they are met you gradually build the expectation and when you are satisfied you </a:t>
+            </a:r>
+            <a:r>
+              <a:rPr lang="en-US" b="1" dirty="0" smtClean="0"/>
+              <a:t>lock it down</a:t>
             </a:r>
             <a:endParaRPr lang="en-US" dirty="0" smtClean="0"/>
-          </a:p>
-          <a:p>
-            <a:r>
-              <a:rPr lang="en-US" dirty="0" smtClean="0"/>
-              <a:t>Input -&gt; processing -&gt; output</a:t>
-            </a:r>
-          </a:p>
-          <a:p>
-            <a:r>
-              <a:rPr lang="en-US" dirty="0" smtClean="0"/>
-              <a:t>Reports and tracing</a:t>
-            </a:r>
-            <a:endParaRPr lang="en-US" dirty="0"/>
           </a:p>
         </p:txBody>
       </p:sp>
     </p:spTree>
     <p:extLst>
       <p:ext uri="{BB962C8B-B14F-4D97-AF65-F5344CB8AC3E}">
-        <p14:creationId xmlns:p14="http://schemas.microsoft.com/office/powerpoint/2010/main" val="2787567367"/>
+        <p14:creationId xmlns:p14="http://schemas.microsoft.com/office/powerpoint/2010/main" val="1066659328"/>
       </p:ext>
     </p:extLst>
   </p:cSld>
@@ -3406,6 +3372,115 @@
           <a:p>
             <a:r>
               <a:rPr lang="en-US" dirty="0" smtClean="0"/>
+              <a:t>Approval Tests</a:t>
+            </a:r>
+            <a:endParaRPr lang="en-US" dirty="0"/>
+          </a:p>
+        </p:txBody>
+      </p:sp>
+      <p:sp>
+        <p:nvSpPr>
+          <p:cNvPr id="3" name="Content Placeholder 2"/>
+          <p:cNvSpPr>
+            <a:spLocks noGrp="1"/>
+          </p:cNvSpPr>
+          <p:nvPr>
+            <p:ph idx="1"/>
+          </p:nvPr>
+        </p:nvSpPr>
+        <p:spPr/>
+        <p:txBody>
+          <a:bodyPr/>
+          <a:lstStyle/>
+          <a:p>
+            <a:r>
+              <a:rPr lang="en-US" dirty="0" smtClean="0"/>
+              <a:t>Changes to existing code with little to no test coverage</a:t>
+            </a:r>
+          </a:p>
+          <a:p>
+            <a:r>
+              <a:rPr lang="en-US" dirty="0" smtClean="0"/>
+              <a:t>Producing public angle </a:t>
+            </a:r>
+            <a:r>
+              <a:rPr lang="en-US" dirty="0" err="1" smtClean="0"/>
+              <a:t>bracket’ish</a:t>
+            </a:r>
+            <a:r>
+              <a:rPr lang="en-US" dirty="0" smtClean="0"/>
+              <a:t> APIs</a:t>
+            </a:r>
+          </a:p>
+          <a:p>
+            <a:r>
+              <a:rPr lang="en-US" dirty="0" smtClean="0"/>
+              <a:t>Input -&gt; processing -&gt; output</a:t>
+            </a:r>
+          </a:p>
+          <a:p>
+            <a:r>
+              <a:rPr lang="en-US" dirty="0" smtClean="0"/>
+              <a:t>Reports and tracing</a:t>
+            </a:r>
+            <a:endParaRPr lang="en-US" dirty="0"/>
+          </a:p>
+        </p:txBody>
+      </p:sp>
+    </p:spTree>
+    <p:extLst>
+      <p:ext uri="{BB962C8B-B14F-4D97-AF65-F5344CB8AC3E}">
+        <p14:creationId xmlns:p14="http://schemas.microsoft.com/office/powerpoint/2010/main" val="2787567367"/>
+      </p:ext>
+    </p:extLst>
+  </p:cSld>
+  <p:clrMapOvr>
+    <a:masterClrMapping/>
+  </p:clrMapOvr>
+  <p:timing>
+    <p:tnLst>
+      <p:par>
+        <p:cTn id="1" dur="indefinite" restart="never" nodeType="tmRoot"/>
+      </p:par>
+    </p:tnLst>
+  </p:timing>
+</p:sld>
+</file>
+
+<file path=ppt/slides/slide5.xml><?xml version="1.0" encoding="utf-8"?>
+<p:sld xmlns:a="http://schemas.openxmlformats.org/drawingml/2006/main" xmlns:r="http://schemas.openxmlformats.org/officeDocument/2006/relationships" xmlns:p="http://schemas.openxmlformats.org/presentationml/2006/main">
+  <p:cSld>
+    <p:spTree>
+      <p:nvGrpSpPr>
+        <p:cNvPr id="1" name=""/>
+        <p:cNvGrpSpPr/>
+        <p:nvPr/>
+      </p:nvGrpSpPr>
+      <p:grpSpPr>
+        <a:xfrm>
+          <a:off x="0" y="0"/>
+          <a:ext cx="0" cy="0"/>
+          <a:chOff x="0" y="0"/>
+          <a:chExt cx="0" cy="0"/>
+        </a:xfrm>
+      </p:grpSpPr>
+      <p:sp>
+        <p:nvSpPr>
+          <p:cNvPr id="2" name="Title 1"/>
+          <p:cNvSpPr>
+            <a:spLocks noGrp="1"/>
+          </p:cNvSpPr>
+          <p:nvPr>
+            <p:ph type="title"/>
+          </p:nvPr>
+        </p:nvSpPr>
+        <p:spPr/>
+        <p:txBody>
+          <a:bodyPr/>
+          <a:lstStyle/>
+          <a:p>
+            <a:r>
+              <a:rPr lang="en-US" dirty="0" smtClean="0"/>
               <a:t>Setup</a:t>
             </a:r>
             <a:endParaRPr lang="en-US" dirty="0"/>
@@ -3473,11 +3548,7 @@
           <a:p>
             <a:r>
               <a:rPr lang="en-US" dirty="0" smtClean="0"/>
-              <a:t>Add *.received.* to ignored files in </a:t>
-            </a:r>
-            <a:r>
-              <a:rPr lang="en-US" smtClean="0"/>
-              <a:t>source control</a:t>
+              <a:t>Add *.received.* to ignored files in source control</a:t>
             </a:r>
             <a:endParaRPr lang="en-US" dirty="0"/>
           </a:p>

</xml_diff>